<commit_message>
Added a hw 4 and hw 6.  Have not yet come up with reading for hw 5.
</commit_message>
<xml_diff>
--- a/notes/Week4-foundations.pptx
+++ b/notes/Week4-foundations.pptx
@@ -236,7 +236,7 @@
           <a:p>
             <a:fld id="{C94BF1D3-5036-4D1A-A3B2-025E6980F662}" type="datetimeFigureOut">
               <a:rPr lang="en-US" smtClean="0"/>
-              <a:t>9/15/2020</a:t>
+              <a:t>9/22/2020</a:t>
             </a:fld>
             <a:endParaRPr lang="en-US"/>
           </a:p>
@@ -401,7 +401,7 @@
           <a:p>
             <a:fld id="{FD852303-BCF1-4F7F-83D3-C9EE5BF074C9}" type="datetimeFigureOut">
               <a:rPr lang="en-US" smtClean="0"/>
-              <a:t>9/15/2020</a:t>
+              <a:t>9/22/2020</a:t>
             </a:fld>
             <a:endParaRPr lang="en-US"/>
           </a:p>
@@ -4774,7 +4774,7 @@
           <a:p>
             <a:r>
               <a:rPr lang="en-US" dirty="0"/>
-              <a:t>We will discuss the articles next week</a:t>
+              <a:t>We will discuss the articles this week</a:t>
             </a:r>
           </a:p>
           <a:p>

</xml_diff>